<commit_message>
vignette for fringillidae taxonomic children
</commit_message>
<xml_diff>
--- a/figures/figure1/figure1-new.pptx
+++ b/figures/figure1/figure1-new.pptx
@@ -243,7 +243,7 @@
           <a:p>
             <a:fld id="{36D6B43A-FB72-2B4A-8DB0-B6C23179BADB}" type="datetimeFigureOut">
               <a:rPr lang="en-US" smtClean="0"/>
-              <a:t>4/11/22</a:t>
+              <a:t>5/7/22</a:t>
             </a:fld>
             <a:endParaRPr lang="en-US"/>
           </a:p>
@@ -413,7 +413,7 @@
           <a:p>
             <a:fld id="{36D6B43A-FB72-2B4A-8DB0-B6C23179BADB}" type="datetimeFigureOut">
               <a:rPr lang="en-US" smtClean="0"/>
-              <a:t>4/11/22</a:t>
+              <a:t>5/7/22</a:t>
             </a:fld>
             <a:endParaRPr lang="en-US"/>
           </a:p>
@@ -593,7 +593,7 @@
           <a:p>
             <a:fld id="{36D6B43A-FB72-2B4A-8DB0-B6C23179BADB}" type="datetimeFigureOut">
               <a:rPr lang="en-US" smtClean="0"/>
-              <a:t>4/11/22</a:t>
+              <a:t>5/7/22</a:t>
             </a:fld>
             <a:endParaRPr lang="en-US"/>
           </a:p>
@@ -763,7 +763,7 @@
           <a:p>
             <a:fld id="{36D6B43A-FB72-2B4A-8DB0-B6C23179BADB}" type="datetimeFigureOut">
               <a:rPr lang="en-US" smtClean="0"/>
-              <a:t>4/11/22</a:t>
+              <a:t>5/7/22</a:t>
             </a:fld>
             <a:endParaRPr lang="en-US"/>
           </a:p>
@@ -1009,7 +1009,7 @@
           <a:p>
             <a:fld id="{36D6B43A-FB72-2B4A-8DB0-B6C23179BADB}" type="datetimeFigureOut">
               <a:rPr lang="en-US" smtClean="0"/>
-              <a:t>4/11/22</a:t>
+              <a:t>5/7/22</a:t>
             </a:fld>
             <a:endParaRPr lang="en-US"/>
           </a:p>
@@ -1241,7 +1241,7 @@
           <a:p>
             <a:fld id="{36D6B43A-FB72-2B4A-8DB0-B6C23179BADB}" type="datetimeFigureOut">
               <a:rPr lang="en-US" smtClean="0"/>
-              <a:t>4/11/22</a:t>
+              <a:t>5/7/22</a:t>
             </a:fld>
             <a:endParaRPr lang="en-US"/>
           </a:p>
@@ -1608,7 +1608,7 @@
           <a:p>
             <a:fld id="{36D6B43A-FB72-2B4A-8DB0-B6C23179BADB}" type="datetimeFigureOut">
               <a:rPr lang="en-US" smtClean="0"/>
-              <a:t>4/11/22</a:t>
+              <a:t>5/7/22</a:t>
             </a:fld>
             <a:endParaRPr lang="en-US"/>
           </a:p>
@@ -1726,7 +1726,7 @@
           <a:p>
             <a:fld id="{36D6B43A-FB72-2B4A-8DB0-B6C23179BADB}" type="datetimeFigureOut">
               <a:rPr lang="en-US" smtClean="0"/>
-              <a:t>4/11/22</a:t>
+              <a:t>5/7/22</a:t>
             </a:fld>
             <a:endParaRPr lang="en-US"/>
           </a:p>
@@ -1821,7 +1821,7 @@
           <a:p>
             <a:fld id="{36D6B43A-FB72-2B4A-8DB0-B6C23179BADB}" type="datetimeFigureOut">
               <a:rPr lang="en-US" smtClean="0"/>
-              <a:t>4/11/22</a:t>
+              <a:t>5/7/22</a:t>
             </a:fld>
             <a:endParaRPr lang="en-US"/>
           </a:p>
@@ -2098,7 +2098,7 @@
           <a:p>
             <a:fld id="{36D6B43A-FB72-2B4A-8DB0-B6C23179BADB}" type="datetimeFigureOut">
               <a:rPr lang="en-US" smtClean="0"/>
-              <a:t>4/11/22</a:t>
+              <a:t>5/7/22</a:t>
             </a:fld>
             <a:endParaRPr lang="en-US"/>
           </a:p>
@@ -2355,7 +2355,7 @@
           <a:p>
             <a:fld id="{36D6B43A-FB72-2B4A-8DB0-B6C23179BADB}" type="datetimeFigureOut">
               <a:rPr lang="en-US" smtClean="0"/>
-              <a:t>4/11/22</a:t>
+              <a:t>5/7/22</a:t>
             </a:fld>
             <a:endParaRPr lang="en-US"/>
           </a:p>
@@ -2568,7 +2568,7 @@
           <a:p>
             <a:fld id="{36D6B43A-FB72-2B4A-8DB0-B6C23179BADB}" type="datetimeFigureOut">
               <a:rPr lang="en-US" smtClean="0"/>
-              <a:t>4/11/22</a:t>
+              <a:t>5/7/22</a:t>
             </a:fld>
             <a:endParaRPr lang="en-US"/>
           </a:p>
@@ -2987,7 +2987,7 @@
         </p:nvGrpSpPr>
         <p:grpSpPr>
           <a:xfrm>
-            <a:off x="11862874" y="5350846"/>
+            <a:off x="10523917" y="5876683"/>
             <a:ext cx="1737083" cy="1037251"/>
             <a:chOff x="8180912" y="11275546"/>
             <a:chExt cx="2375842" cy="1418668"/>
@@ -3157,8 +3157,8 @@
         </p:nvSpPr>
         <p:spPr>
           <a:xfrm>
-            <a:off x="172528" y="621800"/>
-            <a:ext cx="3228484" cy="523220"/>
+            <a:off x="7605" y="726730"/>
+            <a:ext cx="3878935" cy="523220"/>
           </a:xfrm>
           <a:prstGeom prst="rect">
             <a:avLst/>
@@ -3174,7 +3174,7 @@
             <a:pPr algn="ctr"/>
             <a:r>
               <a:rPr lang="en-US" sz="2800" b="1" i="1" dirty="0"/>
-              <a:t>B</a:t>
+              <a:t>A, B</a:t>
             </a:r>
             <a:r>
               <a:rPr lang="en-US" sz="2800" b="1" i="1" baseline="-25000" dirty="0"/>
@@ -3182,7 +3182,7 @@
             </a:r>
             <a:r>
               <a:rPr lang="en-US" sz="2800" b="1" i="1" dirty="0"/>
-              <a:t>,  A,  C,  E,  </a:t>
+              <a:t>, C, D,  E,  </a:t>
             </a:r>
             <a:r>
               <a:rPr lang="en-US" sz="2800" b="1" i="1" dirty="0" err="1"/>
@@ -3191,10 +3191,6 @@
             <a:r>
               <a:rPr lang="en-US" sz="2800" b="1" i="1" baseline="-25000" dirty="0" err="1"/>
               <a:t>x</a:t>
-            </a:r>
-            <a:r>
-              <a:rPr lang="en-US" sz="2800" b="1" i="1" dirty="0"/>
-              <a:t> ,  D</a:t>
             </a:r>
             <a:endParaRPr lang="en-US" sz="2800" b="1" i="1" baseline="-25000" dirty="0"/>
           </a:p>
@@ -3231,7 +3227,7 @@
             <a:pPr algn="ctr"/>
             <a:r>
               <a:rPr lang="en-US" dirty="0"/>
-              <a:t>2) Processing taxon names with </a:t>
+              <a:t>1b) Processing taxon names with </a:t>
             </a:r>
             <a:r>
               <a:rPr lang="en-US" b="1" dirty="0"/>
@@ -3266,7 +3262,7 @@
         </p:nvGrpSpPr>
         <p:grpSpPr>
           <a:xfrm>
-            <a:off x="12850735" y="205627"/>
+            <a:off x="12270757" y="84182"/>
             <a:ext cx="2128684" cy="1689674"/>
             <a:chOff x="349831" y="5774256"/>
             <a:chExt cx="2128684" cy="1689674"/>
@@ -3373,7 +3369,7 @@
         </p:nvGrpSpPr>
         <p:grpSpPr>
           <a:xfrm>
-            <a:off x="10566903" y="192748"/>
+            <a:off x="9811175" y="251718"/>
             <a:ext cx="2145091" cy="1691640"/>
             <a:chOff x="347050" y="4140009"/>
             <a:chExt cx="2145091" cy="1691640"/>
@@ -3480,7 +3476,7 @@
         </p:nvGrpSpPr>
         <p:grpSpPr>
           <a:xfrm>
-            <a:off x="8300322" y="353953"/>
+            <a:off x="12574424" y="1839571"/>
             <a:ext cx="2128684" cy="1442486"/>
             <a:chOff x="3095159" y="6869139"/>
             <a:chExt cx="2128684" cy="1442486"/>
@@ -3587,8 +3583,8 @@
         </p:nvSpPr>
         <p:spPr>
           <a:xfrm>
-            <a:off x="80921" y="2933662"/>
-            <a:ext cx="3262943" cy="523220"/>
+            <a:off x="20961" y="2873702"/>
+            <a:ext cx="3898621" cy="523220"/>
           </a:xfrm>
           <a:prstGeom prst="rect">
             <a:avLst/>
@@ -3611,10 +3607,137 @@
       </p:sp>
       <p:sp>
         <p:nvSpPr>
-          <p:cNvPr id="152" name="Rounded Rectangle 151">
+          <p:cNvPr id="157" name="TextBox 156">
             <a:extLst>
               <a:ext uri="{FF2B5EF4-FFF2-40B4-BE49-F238E27FC236}">
-                <a16:creationId xmlns:a16="http://schemas.microsoft.com/office/drawing/2014/main" id="{EE5806D5-A969-EB41-9E18-D682277B7927}"/>
+                <a16:creationId xmlns:a16="http://schemas.microsoft.com/office/drawing/2014/main" id="{69803FA4-C060-3640-AE0A-B5EB185D5CB9}"/>
+              </a:ext>
+            </a:extLst>
+          </p:cNvPr>
+          <p:cNvSpPr txBox="1"/>
+          <p:nvPr/>
+        </p:nvSpPr>
+        <p:spPr>
+          <a:xfrm>
+            <a:off x="119744" y="91736"/>
+            <a:ext cx="3656643" cy="646331"/>
+          </a:xfrm>
+          <a:prstGeom prst="rect">
+            <a:avLst/>
+          </a:prstGeom>
+          <a:noFill/>
+        </p:spPr>
+        <p:txBody>
+          <a:bodyPr wrap="square" rtlCol="0">
+            <a:spAutoFit/>
+          </a:bodyPr>
+          <a:lstStyle/>
+          <a:p>
+            <a:pPr algn="ctr"/>
+            <a:r>
+              <a:rPr lang="en-US" dirty="0"/>
+              <a:t>1a) A list of </a:t>
+            </a:r>
+            <a:r>
+              <a:rPr lang="en-US" b="1" dirty="0"/>
+              <a:t>taxon names </a:t>
+            </a:r>
+            <a:r>
+              <a:rPr lang="en-US" dirty="0"/>
+              <a:t>provided by the user</a:t>
+            </a:r>
+          </a:p>
+        </p:txBody>
+      </p:sp>
+      <p:sp>
+        <p:nvSpPr>
+          <p:cNvPr id="159" name="TextBox 158">
+            <a:extLst>
+              <a:ext uri="{FF2B5EF4-FFF2-40B4-BE49-F238E27FC236}">
+                <a16:creationId xmlns:a16="http://schemas.microsoft.com/office/drawing/2014/main" id="{79BA94DE-7262-0748-8C22-AEDF266E034A}"/>
+              </a:ext>
+            </a:extLst>
+          </p:cNvPr>
+          <p:cNvSpPr txBox="1"/>
+          <p:nvPr/>
+        </p:nvSpPr>
+        <p:spPr>
+          <a:xfrm>
+            <a:off x="5904454" y="7985328"/>
+            <a:ext cx="3277135" cy="646331"/>
+          </a:xfrm>
+          <a:prstGeom prst="rect">
+            <a:avLst/>
+          </a:prstGeom>
+          <a:noFill/>
+        </p:spPr>
+        <p:txBody>
+          <a:bodyPr wrap="square" rtlCol="0">
+            <a:spAutoFit/>
+          </a:bodyPr>
+          <a:lstStyle/>
+          <a:p>
+            <a:r>
+              <a:rPr lang="en-US" dirty="0"/>
+              <a:t>4) </a:t>
+            </a:r>
+            <a:r>
+              <a:rPr lang="en-US" b="1" dirty="0" err="1"/>
+              <a:t>Congruify</a:t>
+            </a:r>
+            <a:r>
+              <a:rPr lang="en-US" dirty="0"/>
+              <a:t> source chronogram nodes to nodes of tree topology</a:t>
+            </a:r>
+          </a:p>
+        </p:txBody>
+      </p:sp>
+      <p:sp>
+        <p:nvSpPr>
+          <p:cNvPr id="165" name="TextBox 164">
+            <a:extLst>
+              <a:ext uri="{FF2B5EF4-FFF2-40B4-BE49-F238E27FC236}">
+                <a16:creationId xmlns:a16="http://schemas.microsoft.com/office/drawing/2014/main" id="{EB7E5FA8-FC3F-A841-A7A5-691B0FBFB1AF}"/>
+              </a:ext>
+            </a:extLst>
+          </p:cNvPr>
+          <p:cNvSpPr txBox="1"/>
+          <p:nvPr/>
+        </p:nvSpPr>
+        <p:spPr>
+          <a:xfrm>
+            <a:off x="10243036" y="4150739"/>
+            <a:ext cx="2981651" cy="369332"/>
+          </a:xfrm>
+          <a:prstGeom prst="rect">
+            <a:avLst/>
+          </a:prstGeom>
+          <a:noFill/>
+        </p:spPr>
+        <p:txBody>
+          <a:bodyPr wrap="square" rtlCol="0">
+            <a:spAutoFit/>
+          </a:bodyPr>
+          <a:lstStyle/>
+          <a:p>
+            <a:pPr algn="ctr"/>
+            <a:r>
+              <a:rPr lang="en-US" dirty="0"/>
+              <a:t>3) Choose </a:t>
+            </a:r>
+            <a:r>
+              <a:rPr lang="en-US" b="1" dirty="0"/>
+              <a:t>tree topology </a:t>
+            </a:r>
+          </a:p>
+        </p:txBody>
+      </p:sp>
+      <p:sp>
+        <p:nvSpPr>
+          <p:cNvPr id="41" name="Right Arrow 40">
+            <a:extLst>
+              <a:ext uri="{FF2B5EF4-FFF2-40B4-BE49-F238E27FC236}">
+                <a16:creationId xmlns:a16="http://schemas.microsoft.com/office/drawing/2014/main" id="{DFCDBECB-F7D8-C74D-AE89-8D7C4EDD78BC}"/>
               </a:ext>
             </a:extLst>
           </p:cNvPr>
@@ -3623,14 +3746,16 @@
         </p:nvSpPr>
         <p:spPr>
           <a:xfrm>
-            <a:off x="38631" y="1973711"/>
-            <a:ext cx="3376782" cy="1551768"/>
-          </a:xfrm>
-          <a:prstGeom prst="roundRect">
+            <a:off x="3944688" y="2314558"/>
+            <a:ext cx="610913" cy="722643"/>
+          </a:xfrm>
+          <a:prstGeom prst="rightArrow">
             <a:avLst/>
           </a:prstGeom>
-          <a:noFill/>
-          <a:ln w="38100">
+          <a:solidFill>
+            <a:srgbClr val="92D050"/>
+          </a:solidFill>
+          <a:ln>
             <a:solidFill>
               <a:srgbClr val="92D050"/>
             </a:solidFill>
@@ -3668,137 +3793,10 @@
       </p:sp>
       <p:sp>
         <p:nvSpPr>
-          <p:cNvPr id="157" name="TextBox 156">
+          <p:cNvPr id="42" name="Right Arrow 41">
             <a:extLst>
               <a:ext uri="{FF2B5EF4-FFF2-40B4-BE49-F238E27FC236}">
-                <a16:creationId xmlns:a16="http://schemas.microsoft.com/office/drawing/2014/main" id="{69803FA4-C060-3640-AE0A-B5EB185D5CB9}"/>
-              </a:ext>
-            </a:extLst>
-          </p:cNvPr>
-          <p:cNvSpPr txBox="1"/>
-          <p:nvPr/>
-        </p:nvSpPr>
-        <p:spPr>
-          <a:xfrm>
-            <a:off x="119744" y="91736"/>
-            <a:ext cx="3656643" cy="646331"/>
-          </a:xfrm>
-          <a:prstGeom prst="rect">
-            <a:avLst/>
-          </a:prstGeom>
-          <a:noFill/>
-        </p:spPr>
-        <p:txBody>
-          <a:bodyPr wrap="square" rtlCol="0">
-            <a:spAutoFit/>
-          </a:bodyPr>
-          <a:lstStyle/>
-          <a:p>
-            <a:pPr algn="ctr"/>
-            <a:r>
-              <a:rPr lang="en-US" dirty="0"/>
-              <a:t>1) A list of </a:t>
-            </a:r>
-            <a:r>
-              <a:rPr lang="en-US" b="1" dirty="0"/>
-              <a:t>taxon names </a:t>
-            </a:r>
-            <a:r>
-              <a:rPr lang="en-US" dirty="0"/>
-              <a:t>provided by the user</a:t>
-            </a:r>
-          </a:p>
-        </p:txBody>
-      </p:sp>
-      <p:sp>
-        <p:nvSpPr>
-          <p:cNvPr id="159" name="TextBox 158">
-            <a:extLst>
-              <a:ext uri="{FF2B5EF4-FFF2-40B4-BE49-F238E27FC236}">
-                <a16:creationId xmlns:a16="http://schemas.microsoft.com/office/drawing/2014/main" id="{79BA94DE-7262-0748-8C22-AEDF266E034A}"/>
-              </a:ext>
-            </a:extLst>
-          </p:cNvPr>
-          <p:cNvSpPr txBox="1"/>
-          <p:nvPr/>
-        </p:nvSpPr>
-        <p:spPr>
-          <a:xfrm>
-            <a:off x="5904454" y="7985328"/>
-            <a:ext cx="3277135" cy="646331"/>
-          </a:xfrm>
-          <a:prstGeom prst="rect">
-            <a:avLst/>
-          </a:prstGeom>
-          <a:noFill/>
-        </p:spPr>
-        <p:txBody>
-          <a:bodyPr wrap="square" rtlCol="0">
-            <a:spAutoFit/>
-          </a:bodyPr>
-          <a:lstStyle/>
-          <a:p>
-            <a:r>
-              <a:rPr lang="en-US" dirty="0"/>
-              <a:t>5) </a:t>
-            </a:r>
-            <a:r>
-              <a:rPr lang="en-US" b="1" dirty="0" err="1"/>
-              <a:t>Congruify</a:t>
-            </a:r>
-            <a:r>
-              <a:rPr lang="en-US" dirty="0"/>
-              <a:t> source chronogram nodes to nodes of tree topology</a:t>
-            </a:r>
-          </a:p>
-        </p:txBody>
-      </p:sp>
-      <p:sp>
-        <p:nvSpPr>
-          <p:cNvPr id="165" name="TextBox 164">
-            <a:extLst>
-              <a:ext uri="{FF2B5EF4-FFF2-40B4-BE49-F238E27FC236}">
-                <a16:creationId xmlns:a16="http://schemas.microsoft.com/office/drawing/2014/main" id="{EB7E5FA8-FC3F-A841-A7A5-691B0FBFB1AF}"/>
-              </a:ext>
-            </a:extLst>
-          </p:cNvPr>
-          <p:cNvSpPr txBox="1"/>
-          <p:nvPr/>
-        </p:nvSpPr>
-        <p:spPr>
-          <a:xfrm>
-            <a:off x="11202840" y="3416668"/>
-            <a:ext cx="2981651" cy="369332"/>
-          </a:xfrm>
-          <a:prstGeom prst="rect">
-            <a:avLst/>
-          </a:prstGeom>
-          <a:noFill/>
-        </p:spPr>
-        <p:txBody>
-          <a:bodyPr wrap="square" rtlCol="0">
-            <a:spAutoFit/>
-          </a:bodyPr>
-          <a:lstStyle/>
-          <a:p>
-            <a:pPr algn="ctr"/>
-            <a:r>
-              <a:rPr lang="en-US" dirty="0"/>
-              <a:t>4) Choose </a:t>
-            </a:r>
-            <a:r>
-              <a:rPr lang="en-US" b="1" dirty="0"/>
-              <a:t>tree topology </a:t>
-            </a:r>
-          </a:p>
-        </p:txBody>
-      </p:sp>
-      <p:sp>
-        <p:nvSpPr>
-          <p:cNvPr id="41" name="Right Arrow 40">
-            <a:extLst>
-              <a:ext uri="{FF2B5EF4-FFF2-40B4-BE49-F238E27FC236}">
-                <a16:creationId xmlns:a16="http://schemas.microsoft.com/office/drawing/2014/main" id="{DFCDBECB-F7D8-C74D-AE89-8D7C4EDD78BC}"/>
+                <a16:creationId xmlns:a16="http://schemas.microsoft.com/office/drawing/2014/main" id="{C34DE3F3-9297-EA41-A318-75D27C90CE93}"/>
               </a:ext>
             </a:extLst>
           </p:cNvPr>
@@ -3806,9 +3804,9 @@
           <p:nvPr/>
         </p:nvSpPr>
         <p:spPr>
-          <a:xfrm>
-            <a:off x="3450769" y="1965729"/>
-            <a:ext cx="610913" cy="722643"/>
+          <a:xfrm rot="10800000" flipV="1">
+            <a:off x="4800474" y="5511158"/>
+            <a:ext cx="688359" cy="716625"/>
           </a:xfrm>
           <a:prstGeom prst="rightArrow">
             <a:avLst/>
@@ -3854,10 +3852,50 @@
       </p:sp>
       <p:sp>
         <p:nvSpPr>
-          <p:cNvPr id="42" name="Right Arrow 41">
+          <p:cNvPr id="44" name="TextBox 43">
             <a:extLst>
               <a:ext uri="{FF2B5EF4-FFF2-40B4-BE49-F238E27FC236}">
-                <a16:creationId xmlns:a16="http://schemas.microsoft.com/office/drawing/2014/main" id="{C34DE3F3-9297-EA41-A318-75D27C90CE93}"/>
+                <a16:creationId xmlns:a16="http://schemas.microsoft.com/office/drawing/2014/main" id="{AE041B43-3B0C-AD4C-BC5E-3486F0A0EABA}"/>
+              </a:ext>
+            </a:extLst>
+          </p:cNvPr>
+          <p:cNvSpPr txBox="1"/>
+          <p:nvPr/>
+        </p:nvSpPr>
+        <p:spPr>
+          <a:xfrm>
+            <a:off x="159294" y="8055261"/>
+            <a:ext cx="4345558" cy="646331"/>
+          </a:xfrm>
+          <a:prstGeom prst="rect">
+            <a:avLst/>
+          </a:prstGeom>
+          <a:noFill/>
+        </p:spPr>
+        <p:txBody>
+          <a:bodyPr wrap="square" rtlCol="0">
+            <a:spAutoFit/>
+          </a:bodyPr>
+          <a:lstStyle/>
+          <a:p>
+            <a:pPr algn="ctr"/>
+            <a:r>
+              <a:rPr lang="en-US" dirty="0"/>
+              <a:t>5) Use ages of congruent nodes to </a:t>
+            </a:r>
+            <a:r>
+              <a:rPr lang="en-US" b="1" dirty="0"/>
+              <a:t>date a tree topology</a:t>
+            </a:r>
+          </a:p>
+        </p:txBody>
+      </p:sp>
+      <p:sp>
+        <p:nvSpPr>
+          <p:cNvPr id="45" name="Rounded Rectangle 44">
+            <a:extLst>
+              <a:ext uri="{FF2B5EF4-FFF2-40B4-BE49-F238E27FC236}">
+                <a16:creationId xmlns:a16="http://schemas.microsoft.com/office/drawing/2014/main" id="{7935E882-84C9-6D44-A54C-7F063C054409}"/>
               </a:ext>
             </a:extLst>
           </p:cNvPr>
@@ -3865,17 +3903,15 @@
           <p:nvPr/>
         </p:nvSpPr>
         <p:spPr>
-          <a:xfrm rot="10800000" flipV="1">
-            <a:off x="4800474" y="5511158"/>
-            <a:ext cx="688359" cy="716625"/>
-          </a:xfrm>
-          <a:prstGeom prst="rightArrow">
+          <a:xfrm>
+            <a:off x="10231494" y="4023149"/>
+            <a:ext cx="4902007" cy="4993736"/>
+          </a:xfrm>
+          <a:prstGeom prst="roundRect">
             <a:avLst/>
           </a:prstGeom>
-          <a:solidFill>
-            <a:srgbClr val="92D050"/>
-          </a:solidFill>
-          <a:ln>
+          <a:noFill/>
+          <a:ln w="38100">
             <a:solidFill>
               <a:srgbClr val="92D050"/>
             </a:solidFill>
@@ -3913,50 +3949,10 @@
       </p:sp>
       <p:sp>
         <p:nvSpPr>
-          <p:cNvPr id="44" name="TextBox 43">
+          <p:cNvPr id="46" name="Rounded Rectangle 45">
             <a:extLst>
               <a:ext uri="{FF2B5EF4-FFF2-40B4-BE49-F238E27FC236}">
-                <a16:creationId xmlns:a16="http://schemas.microsoft.com/office/drawing/2014/main" id="{AE041B43-3B0C-AD4C-BC5E-3486F0A0EABA}"/>
-              </a:ext>
-            </a:extLst>
-          </p:cNvPr>
-          <p:cNvSpPr txBox="1"/>
-          <p:nvPr/>
-        </p:nvSpPr>
-        <p:spPr>
-          <a:xfrm>
-            <a:off x="159294" y="8055261"/>
-            <a:ext cx="4345558" cy="646331"/>
-          </a:xfrm>
-          <a:prstGeom prst="rect">
-            <a:avLst/>
-          </a:prstGeom>
-          <a:noFill/>
-        </p:spPr>
-        <p:txBody>
-          <a:bodyPr wrap="square" rtlCol="0">
-            <a:spAutoFit/>
-          </a:bodyPr>
-          <a:lstStyle/>
-          <a:p>
-            <a:pPr algn="ctr"/>
-            <a:r>
-              <a:rPr lang="en-US" dirty="0"/>
-              <a:t>6) Use ages of congruent nodes to </a:t>
-            </a:r>
-            <a:r>
-              <a:rPr lang="en-US" b="1" dirty="0"/>
-              <a:t>date a tree topology</a:t>
-            </a:r>
-          </a:p>
-        </p:txBody>
-      </p:sp>
-      <p:sp>
-        <p:nvSpPr>
-          <p:cNvPr id="45" name="Rounded Rectangle 44">
-            <a:extLst>
-              <a:ext uri="{FF2B5EF4-FFF2-40B4-BE49-F238E27FC236}">
-                <a16:creationId xmlns:a16="http://schemas.microsoft.com/office/drawing/2014/main" id="{7935E882-84C9-6D44-A54C-7F063C054409}"/>
+                <a16:creationId xmlns:a16="http://schemas.microsoft.com/office/drawing/2014/main" id="{DF4C36AE-6208-E241-994B-9CB06B47231B}"/>
               </a:ext>
             </a:extLst>
           </p:cNvPr>
@@ -3965,8 +3961,8 @@
         </p:nvSpPr>
         <p:spPr>
           <a:xfrm>
-            <a:off x="10231494" y="3410413"/>
-            <a:ext cx="4902007" cy="5606472"/>
+            <a:off x="38630" y="4023149"/>
+            <a:ext cx="4719774" cy="4993736"/>
           </a:xfrm>
           <a:prstGeom prst="roundRect">
             <a:avLst/>
@@ -4010,10 +4006,66 @@
       </p:sp>
       <p:sp>
         <p:nvSpPr>
-          <p:cNvPr id="46" name="Rounded Rectangle 45">
+          <p:cNvPr id="47" name="TextBox 46">
             <a:extLst>
               <a:ext uri="{FF2B5EF4-FFF2-40B4-BE49-F238E27FC236}">
-                <a16:creationId xmlns:a16="http://schemas.microsoft.com/office/drawing/2014/main" id="{DF4C36AE-6208-E241-994B-9CB06B47231B}"/>
+                <a16:creationId xmlns:a16="http://schemas.microsoft.com/office/drawing/2014/main" id="{975C0793-409C-F546-BDAB-F28196CE4460}"/>
+              </a:ext>
+            </a:extLst>
+          </p:cNvPr>
+          <p:cNvSpPr txBox="1"/>
+          <p:nvPr/>
+        </p:nvSpPr>
+        <p:spPr>
+          <a:xfrm>
+            <a:off x="4685605" y="2691844"/>
+            <a:ext cx="4184986" cy="646331"/>
+          </a:xfrm>
+          <a:prstGeom prst="rect">
+            <a:avLst/>
+          </a:prstGeom>
+          <a:noFill/>
+        </p:spPr>
+        <p:txBody>
+          <a:bodyPr wrap="square" rtlCol="0">
+            <a:spAutoFit/>
+          </a:bodyPr>
+          <a:lstStyle/>
+          <a:p>
+            <a:pPr algn="ctr"/>
+            <a:r>
+              <a:rPr lang="en-US" dirty="0"/>
+              <a:t>2a) Search </a:t>
+            </a:r>
+            <a:r>
+              <a:rPr lang="en-US" b="1" dirty="0"/>
+              <a:t>processed taxon names</a:t>
+            </a:r>
+            <a:r>
+              <a:rPr lang="en-US" dirty="0"/>
+              <a:t> in chronogram database and identify</a:t>
+            </a:r>
+            <a:r>
+              <a:rPr lang="en-US" dirty="0">
+                <a:solidFill>
+                  <a:srgbClr val="FF0000"/>
+                </a:solidFill>
+              </a:rPr>
+              <a:t>*</a:t>
+            </a:r>
+            <a:r>
+              <a:rPr lang="en-US" dirty="0"/>
+              <a:t> </a:t>
+            </a:r>
+          </a:p>
+        </p:txBody>
+      </p:sp>
+      <p:sp>
+        <p:nvSpPr>
+          <p:cNvPr id="49" name="Rounded Rectangle 48">
+            <a:extLst>
+              <a:ext uri="{FF2B5EF4-FFF2-40B4-BE49-F238E27FC236}">
+                <a16:creationId xmlns:a16="http://schemas.microsoft.com/office/drawing/2014/main" id="{56623323-5AFA-0840-A232-8400F1FBBC9D}"/>
               </a:ext>
             </a:extLst>
           </p:cNvPr>
@@ -4022,8 +4074,8 @@
         </p:nvSpPr>
         <p:spPr>
           <a:xfrm>
-            <a:off x="38630" y="4023149"/>
-            <a:ext cx="4719774" cy="4993736"/>
+            <a:off x="8761" y="-8906"/>
+            <a:ext cx="3898621" cy="3405827"/>
           </a:xfrm>
           <a:prstGeom prst="roundRect">
             <a:avLst/>
@@ -4067,10 +4119,10 @@
       </p:sp>
       <p:sp>
         <p:nvSpPr>
-          <p:cNvPr id="47" name="TextBox 46">
+          <p:cNvPr id="51" name="TextBox 50">
             <a:extLst>
               <a:ext uri="{FF2B5EF4-FFF2-40B4-BE49-F238E27FC236}">
-                <a16:creationId xmlns:a16="http://schemas.microsoft.com/office/drawing/2014/main" id="{975C0793-409C-F546-BDAB-F28196CE4460}"/>
+                <a16:creationId xmlns:a16="http://schemas.microsoft.com/office/drawing/2014/main" id="{E51426A1-0692-484A-9BA0-880D455CEDDD}"/>
               </a:ext>
             </a:extLst>
           </p:cNvPr>
@@ -4079,8 +4131,8 @@
         </p:nvSpPr>
         <p:spPr>
           <a:xfrm>
-            <a:off x="4286154" y="1987059"/>
-            <a:ext cx="4184986" cy="646331"/>
+            <a:off x="9467893" y="2467444"/>
+            <a:ext cx="2836889" cy="923330"/>
           </a:xfrm>
           <a:prstGeom prst="rect">
             <a:avLst/>
@@ -4096,37 +4148,21 @@
             <a:pPr algn="ctr"/>
             <a:r>
               <a:rPr lang="en-US" dirty="0"/>
-              <a:t>3a) Search </a:t>
+              <a:t>2b) prune matching chronograms = </a:t>
             </a:r>
             <a:r>
               <a:rPr lang="en-US" b="1" dirty="0"/>
-              <a:t>processed taxon names</a:t>
-            </a:r>
-            <a:r>
-              <a:rPr lang="en-US" dirty="0"/>
-              <a:t> in chronogram database and identify</a:t>
-            </a:r>
-            <a:r>
-              <a:rPr lang="en-US" dirty="0">
-                <a:solidFill>
-                  <a:srgbClr val="FF0000"/>
-                </a:solidFill>
-              </a:rPr>
-              <a:t>*</a:t>
-            </a:r>
-            <a:r>
-              <a:rPr lang="en-US" dirty="0"/>
-              <a:t> </a:t>
-            </a:r>
-          </a:p>
-        </p:txBody>
-      </p:sp>
-      <p:sp>
-        <p:nvSpPr>
-          <p:cNvPr id="49" name="Rounded Rectangle 48">
+              <a:t>source chronograms</a:t>
+            </a:r>
+          </a:p>
+        </p:txBody>
+      </p:sp>
+      <p:sp>
+        <p:nvSpPr>
+          <p:cNvPr id="54" name="Rounded Rectangle 53">
             <a:extLst>
               <a:ext uri="{FF2B5EF4-FFF2-40B4-BE49-F238E27FC236}">
-                <a16:creationId xmlns:a16="http://schemas.microsoft.com/office/drawing/2014/main" id="{56623323-5AFA-0840-A232-8400F1FBBC9D}"/>
+                <a16:creationId xmlns:a16="http://schemas.microsoft.com/office/drawing/2014/main" id="{DC50EA97-6647-2143-B29D-D0F836D6D119}"/>
               </a:ext>
             </a:extLst>
           </p:cNvPr>
@@ -4135,8 +4171,8 @@
         </p:nvSpPr>
         <p:spPr>
           <a:xfrm>
-            <a:off x="8762" y="51055"/>
-            <a:ext cx="3767624" cy="1193574"/>
+            <a:off x="5579870" y="4025907"/>
+            <a:ext cx="3888023" cy="4993736"/>
           </a:xfrm>
           <a:prstGeom prst="roundRect">
             <a:avLst/>
@@ -4178,103 +4214,6 @@
           </a:p>
         </p:txBody>
       </p:sp>
-      <p:sp>
-        <p:nvSpPr>
-          <p:cNvPr id="51" name="TextBox 50">
-            <a:extLst>
-              <a:ext uri="{FF2B5EF4-FFF2-40B4-BE49-F238E27FC236}">
-                <a16:creationId xmlns:a16="http://schemas.microsoft.com/office/drawing/2014/main" id="{E51426A1-0692-484A-9BA0-880D455CEDDD}"/>
-              </a:ext>
-            </a:extLst>
-          </p:cNvPr>
-          <p:cNvSpPr txBox="1"/>
-          <p:nvPr/>
-        </p:nvSpPr>
-        <p:spPr>
-          <a:xfrm>
-            <a:off x="8278561" y="2074459"/>
-            <a:ext cx="6711195" cy="369332"/>
-          </a:xfrm>
-          <a:prstGeom prst="rect">
-            <a:avLst/>
-          </a:prstGeom>
-          <a:noFill/>
-        </p:spPr>
-        <p:txBody>
-          <a:bodyPr wrap="square" rtlCol="0">
-            <a:spAutoFit/>
-          </a:bodyPr>
-          <a:lstStyle/>
-          <a:p>
-            <a:pPr algn="ctr"/>
-            <a:r>
-              <a:rPr lang="en-US" dirty="0"/>
-              <a:t>3b) prune matching chronograms = </a:t>
-            </a:r>
-            <a:r>
-              <a:rPr lang="en-US" b="1" dirty="0"/>
-              <a:t>source chronograms</a:t>
-            </a:r>
-          </a:p>
-        </p:txBody>
-      </p:sp>
-      <p:sp>
-        <p:nvSpPr>
-          <p:cNvPr id="54" name="Rounded Rectangle 53">
-            <a:extLst>
-              <a:ext uri="{FF2B5EF4-FFF2-40B4-BE49-F238E27FC236}">
-                <a16:creationId xmlns:a16="http://schemas.microsoft.com/office/drawing/2014/main" id="{DC50EA97-6647-2143-B29D-D0F836D6D119}"/>
-              </a:ext>
-            </a:extLst>
-          </p:cNvPr>
-          <p:cNvSpPr/>
-          <p:nvPr/>
-        </p:nvSpPr>
-        <p:spPr>
-          <a:xfrm>
-            <a:off x="5579870" y="4025907"/>
-            <a:ext cx="3888023" cy="4993736"/>
-          </a:xfrm>
-          <a:prstGeom prst="roundRect">
-            <a:avLst/>
-          </a:prstGeom>
-          <a:noFill/>
-          <a:ln w="38100">
-            <a:solidFill>
-              <a:srgbClr val="92D050"/>
-            </a:solidFill>
-          </a:ln>
-        </p:spPr>
-        <p:style>
-          <a:lnRef idx="2">
-            <a:schemeClr val="accent1">
-              <a:shade val="50000"/>
-            </a:schemeClr>
-          </a:lnRef>
-          <a:fillRef idx="1">
-            <a:schemeClr val="accent1"/>
-          </a:fillRef>
-          <a:effectRef idx="0">
-            <a:schemeClr val="accent1"/>
-          </a:effectRef>
-          <a:fontRef idx="minor">
-            <a:schemeClr val="lt1"/>
-          </a:fontRef>
-        </p:style>
-        <p:txBody>
-          <a:bodyPr rot="0" spcFirstLastPara="0" vertOverflow="overflow" horzOverflow="overflow" vert="horz" wrap="square" lIns="91440" tIns="45720" rIns="91440" bIns="45720" numCol="1" spcCol="0" rtlCol="0" fromWordArt="0" anchor="ctr" anchorCtr="0" forceAA="0" compatLnSpc="1">
-            <a:prstTxWarp prst="textNoShape">
-              <a:avLst/>
-            </a:prstTxWarp>
-            <a:noAutofit/>
-          </a:bodyPr>
-          <a:lstStyle/>
-          <a:p>
-            <a:pPr algn="ctr"/>
-            <a:endParaRPr lang="en-US"/>
-          </a:p>
-        </p:txBody>
-      </p:sp>
       <p:grpSp>
         <p:nvGrpSpPr>
           <p:cNvPr id="5" name="Group 4">
@@ -4289,7 +4228,7 @@
         </p:nvGrpSpPr>
         <p:grpSpPr>
           <a:xfrm>
-            <a:off x="10338698" y="4661053"/>
+            <a:off x="10338698" y="4541133"/>
             <a:ext cx="1240513" cy="1220852"/>
             <a:chOff x="10386505" y="7974231"/>
             <a:chExt cx="1706127" cy="1679086"/>
@@ -4479,8 +4418,8 @@
         </p:nvSpPr>
         <p:spPr>
           <a:xfrm rot="5400000" flipV="1">
-            <a:off x="12334785" y="2706509"/>
-            <a:ext cx="688359" cy="716625"/>
+            <a:off x="11912377" y="3341237"/>
+            <a:ext cx="617547" cy="716625"/>
           </a:xfrm>
           <a:prstGeom prst="rightArrow">
             <a:avLst/>
@@ -4538,7 +4477,7 @@
         </p:nvGrpSpPr>
         <p:grpSpPr>
           <a:xfrm>
-            <a:off x="11579210" y="4122669"/>
+            <a:off x="11744800" y="4579729"/>
             <a:ext cx="1362974" cy="1227483"/>
             <a:chOff x="11668312" y="9142886"/>
             <a:chExt cx="1481924" cy="1334609"/>
@@ -4665,8 +4604,8 @@
         </p:nvSpPr>
         <p:spPr>
           <a:xfrm>
-            <a:off x="4062531" y="96057"/>
-            <a:ext cx="11070969" cy="2583831"/>
+            <a:off x="4618329" y="-8873"/>
+            <a:ext cx="10515171" cy="3399647"/>
           </a:xfrm>
           <a:prstGeom prst="roundRect">
             <a:avLst/>
@@ -4885,8 +4824,8 @@
         </p:nvSpPr>
         <p:spPr>
           <a:xfrm rot="5400000" flipV="1">
-            <a:off x="1474683" y="1250917"/>
-            <a:ext cx="688359" cy="716625"/>
+            <a:off x="1597334" y="1253648"/>
+            <a:ext cx="443057" cy="716625"/>
           </a:xfrm>
           <a:prstGeom prst="rightArrow">
             <a:avLst/>
@@ -5068,7 +5007,7 @@
         </p:blipFill>
         <p:spPr>
           <a:xfrm>
-            <a:off x="4386761" y="738067"/>
+            <a:off x="4820317" y="988340"/>
             <a:ext cx="518012" cy="1154930"/>
           </a:xfrm>
           <a:prstGeom prst="rect">
@@ -5097,7 +5036,7 @@
         </p:blipFill>
         <p:spPr>
           <a:xfrm>
-            <a:off x="4619485" y="127115"/>
+            <a:off x="5486856" y="-737"/>
             <a:ext cx="606779" cy="1369173"/>
           </a:xfrm>
           <a:prstGeom prst="rect">
@@ -5126,7 +5065,7 @@
         </p:blipFill>
         <p:spPr>
           <a:xfrm>
-            <a:off x="5343347" y="86964"/>
+            <a:off x="6194561" y="26373"/>
             <a:ext cx="511153" cy="1423388"/>
           </a:xfrm>
           <a:prstGeom prst="rect">
@@ -5155,7 +5094,7 @@
         </p:blipFill>
         <p:spPr>
           <a:xfrm>
-            <a:off x="6060557" y="230343"/>
+            <a:off x="6930262" y="746051"/>
             <a:ext cx="606780" cy="1689675"/>
           </a:xfrm>
           <a:prstGeom prst="rect">
@@ -5184,7 +5123,7 @@
         </p:blipFill>
         <p:spPr>
           <a:xfrm>
-            <a:off x="5024405" y="1602488"/>
+            <a:off x="5458090" y="2121178"/>
             <a:ext cx="883578" cy="377873"/>
           </a:xfrm>
           <a:prstGeom prst="rect">
@@ -5213,7 +5152,7 @@
         </p:blipFill>
         <p:spPr>
           <a:xfrm>
-            <a:off x="4172815" y="562475"/>
+            <a:off x="4754472" y="428904"/>
             <a:ext cx="445514" cy="427843"/>
           </a:xfrm>
           <a:prstGeom prst="rect">
@@ -5242,7 +5181,7 @@
         </p:blipFill>
         <p:spPr>
           <a:xfrm>
-            <a:off x="6819911" y="268291"/>
+            <a:off x="7697741" y="289690"/>
             <a:ext cx="729573" cy="372749"/>
           </a:xfrm>
           <a:prstGeom prst="rect">
@@ -5271,7 +5210,7 @@
         </p:blipFill>
         <p:spPr>
           <a:xfrm>
-            <a:off x="6777490" y="648616"/>
+            <a:off x="7766031" y="1249950"/>
             <a:ext cx="729572" cy="1346019"/>
           </a:xfrm>
           <a:prstGeom prst="rect">
@@ -5293,7 +5232,7 @@
         </p:nvSpPr>
         <p:spPr>
           <a:xfrm>
-            <a:off x="7655919" y="874954"/>
+            <a:off x="8832374" y="2562056"/>
             <a:ext cx="558267" cy="722643"/>
           </a:xfrm>
           <a:prstGeom prst="rightArrow">
@@ -5352,7 +5291,7 @@
         </p:nvSpPr>
         <p:spPr>
           <a:xfrm>
-            <a:off x="4726671" y="135997"/>
+            <a:off x="6630180" y="357398"/>
             <a:ext cx="300082" cy="369332"/>
           </a:xfrm>
           <a:prstGeom prst="rect">
@@ -5391,7 +5330,7 @@
         </p:nvSpPr>
         <p:spPr>
           <a:xfrm>
-            <a:off x="5259050" y="1566197"/>
+            <a:off x="4941918" y="230235"/>
             <a:ext cx="300082" cy="369332"/>
           </a:xfrm>
           <a:prstGeom prst="rect">
@@ -5430,7 +5369,7 @@
         </p:nvSpPr>
         <p:spPr>
           <a:xfrm>
-            <a:off x="6943974" y="960354"/>
+            <a:off x="7871245" y="1464158"/>
             <a:ext cx="300082" cy="369332"/>
           </a:xfrm>
           <a:prstGeom prst="rect">

</xml_diff>

<commit_message>
developing function to get OTT taxonomic children species only
</commit_message>
<xml_diff>
--- a/figures/figure1/figure1-new.pptx
+++ b/figures/figure1/figure1-new.pptx
@@ -3211,7 +3211,7 @@
         <p:spPr>
           <a:xfrm>
             <a:off x="-5345" y="1941050"/>
-            <a:ext cx="3349209" cy="923330"/>
+            <a:ext cx="3853372" cy="646331"/>
           </a:xfrm>
           <a:prstGeom prst="rect">
             <a:avLst/>
@@ -3243,7 +3243,7 @@
             </a:r>
             <a:r>
               <a:rPr lang="en-US" dirty="0"/>
-              <a:t> them to a taxonomy</a:t>
+              <a:t> them to a taxonomy.</a:t>
             </a:r>
           </a:p>
         </p:txBody>
@@ -3262,7 +3262,7 @@
         </p:nvGrpSpPr>
         <p:grpSpPr>
           <a:xfrm>
-            <a:off x="12270757" y="84182"/>
+            <a:off x="12090877" y="54202"/>
             <a:ext cx="2128684" cy="1689674"/>
             <a:chOff x="349831" y="5774256"/>
             <a:chExt cx="2128684" cy="1689674"/>
@@ -3476,7 +3476,7 @@
         </p:nvGrpSpPr>
         <p:grpSpPr>
           <a:xfrm>
-            <a:off x="12574424" y="1839571"/>
+            <a:off x="12799274" y="1839571"/>
             <a:ext cx="2128684" cy="1442486"/>
             <a:chOff x="3095159" y="6869139"/>
             <a:chExt cx="2128684" cy="1442486"/>
@@ -3620,7 +3620,7 @@
         <p:spPr>
           <a:xfrm>
             <a:off x="119744" y="91736"/>
-            <a:ext cx="3656643" cy="646331"/>
+            <a:ext cx="3780902" cy="646331"/>
           </a:xfrm>
           <a:prstGeom prst="rect">
             <a:avLst/>
@@ -3644,7 +3644,7 @@
             </a:r>
             <a:r>
               <a:rPr lang="en-US" dirty="0"/>
-              <a:t>provided by the user</a:t>
+              <a:t>provided by the user.</a:t>
             </a:r>
           </a:p>
         </p:txBody>
@@ -3904,8 +3904,8 @@
         </p:nvSpPr>
         <p:spPr>
           <a:xfrm>
-            <a:off x="10231494" y="4023149"/>
-            <a:ext cx="4902007" cy="4993736"/>
+            <a:off x="10231494" y="4023148"/>
+            <a:ext cx="4902007" cy="5120851"/>
           </a:xfrm>
           <a:prstGeom prst="roundRect">
             <a:avLst/>
@@ -3961,8 +3961,8 @@
         </p:nvSpPr>
         <p:spPr>
           <a:xfrm>
-            <a:off x="38630" y="4023149"/>
-            <a:ext cx="4719774" cy="4993736"/>
+            <a:off x="38630" y="4023148"/>
+            <a:ext cx="4719774" cy="5091719"/>
           </a:xfrm>
           <a:prstGeom prst="roundRect">
             <a:avLst/>
@@ -4018,8 +4018,8 @@
         </p:nvSpPr>
         <p:spPr>
           <a:xfrm>
-            <a:off x="4685605" y="2691844"/>
-            <a:ext cx="4184986" cy="646331"/>
+            <a:off x="4606129" y="2691844"/>
+            <a:ext cx="4264462" cy="646331"/>
           </a:xfrm>
           <a:prstGeom prst="rect">
             <a:avLst/>
@@ -4035,7 +4035,7 @@
             <a:pPr algn="ctr"/>
             <a:r>
               <a:rPr lang="en-US" dirty="0"/>
-              <a:t>2a) Search </a:t>
+              <a:t>2a) Match </a:t>
             </a:r>
             <a:r>
               <a:rPr lang="en-US" b="1" dirty="0"/>
@@ -4043,7 +4043,7 @@
             </a:r>
             <a:r>
               <a:rPr lang="en-US" dirty="0"/>
-              <a:t> in chronogram database and identify</a:t>
+              <a:t> to chronogram database and identify (</a:t>
             </a:r>
             <a:r>
               <a:rPr lang="en-US" dirty="0">
@@ -4055,7 +4055,7 @@
             </a:r>
             <a:r>
               <a:rPr lang="en-US" dirty="0"/>
-              <a:t> </a:t>
+              <a:t>). </a:t>
             </a:r>
           </a:p>
         </p:txBody>
@@ -4148,11 +4148,15 @@
             <a:pPr algn="ctr"/>
             <a:r>
               <a:rPr lang="en-US" dirty="0"/>
-              <a:t>2b) prune matching chronograms = </a:t>
+              <a:t>2b) Prune matching chronograms (</a:t>
             </a:r>
             <a:r>
               <a:rPr lang="en-US" b="1" dirty="0"/>
               <a:t>source chronograms</a:t>
+            </a:r>
+            <a:r>
+              <a:rPr lang="en-US" dirty="0"/>
+              <a:t>).</a:t>
             </a:r>
           </a:p>
         </p:txBody>
@@ -4172,7 +4176,7 @@
         <p:spPr>
           <a:xfrm>
             <a:off x="5579870" y="4025907"/>
-            <a:ext cx="3888023" cy="4993736"/>
+            <a:ext cx="3888023" cy="5091720"/>
           </a:xfrm>
           <a:prstGeom prst="roundRect">
             <a:avLst/>
@@ -4675,8 +4679,8 @@
         </p:blipFill>
         <p:spPr>
           <a:xfrm>
-            <a:off x="10762836" y="6027641"/>
-            <a:ext cx="3501300" cy="3501300"/>
+            <a:off x="10443628" y="5858333"/>
+            <a:ext cx="3925438" cy="3925438"/>
           </a:xfrm>
           <a:prstGeom prst="rect">
             <a:avLst/>
@@ -4697,7 +4701,7 @@
         </p:nvGrpSpPr>
         <p:grpSpPr>
           <a:xfrm>
-            <a:off x="13830119" y="5267345"/>
+            <a:off x="13890079" y="5612115"/>
             <a:ext cx="1148104" cy="898320"/>
             <a:chOff x="12975475" y="4116437"/>
             <a:chExt cx="1148104" cy="898320"/>
@@ -4883,7 +4887,7 @@
         </p:nvGrpSpPr>
         <p:grpSpPr>
           <a:xfrm>
-            <a:off x="13232606" y="4050780"/>
+            <a:off x="13247596" y="4305610"/>
             <a:ext cx="1362974" cy="1227483"/>
             <a:chOff x="11668312" y="9142886"/>
             <a:chExt cx="1481924" cy="1334609"/>
@@ -5181,7 +5185,7 @@
         </p:blipFill>
         <p:spPr>
           <a:xfrm>
-            <a:off x="7697741" y="289690"/>
+            <a:off x="7532851" y="109810"/>
             <a:ext cx="729573" cy="372749"/>
           </a:xfrm>
           <a:prstGeom prst="rect">
@@ -5210,7 +5214,7 @@
         </p:blipFill>
         <p:spPr>
           <a:xfrm>
-            <a:off x="7766031" y="1249950"/>
+            <a:off x="7751041" y="950150"/>
             <a:ext cx="729572" cy="1346019"/>
           </a:xfrm>
           <a:prstGeom prst="rect">

</xml_diff>

<commit_message>
adding congruification vignette and updating others
</commit_message>
<xml_diff>
--- a/figures/figure1/figure1-new.pptx
+++ b/figures/figure1/figure1-new.pptx
@@ -243,7 +243,7 @@
           <a:p>
             <a:fld id="{36D6B43A-FB72-2B4A-8DB0-B6C23179BADB}" type="datetimeFigureOut">
               <a:rPr lang="en-US" smtClean="0"/>
-              <a:t>5/7/22</a:t>
+              <a:t>5/11/22</a:t>
             </a:fld>
             <a:endParaRPr lang="en-US"/>
           </a:p>
@@ -413,7 +413,7 @@
           <a:p>
             <a:fld id="{36D6B43A-FB72-2B4A-8DB0-B6C23179BADB}" type="datetimeFigureOut">
               <a:rPr lang="en-US" smtClean="0"/>
-              <a:t>5/7/22</a:t>
+              <a:t>5/11/22</a:t>
             </a:fld>
             <a:endParaRPr lang="en-US"/>
           </a:p>
@@ -593,7 +593,7 @@
           <a:p>
             <a:fld id="{36D6B43A-FB72-2B4A-8DB0-B6C23179BADB}" type="datetimeFigureOut">
               <a:rPr lang="en-US" smtClean="0"/>
-              <a:t>5/7/22</a:t>
+              <a:t>5/11/22</a:t>
             </a:fld>
             <a:endParaRPr lang="en-US"/>
           </a:p>
@@ -763,7 +763,7 @@
           <a:p>
             <a:fld id="{36D6B43A-FB72-2B4A-8DB0-B6C23179BADB}" type="datetimeFigureOut">
               <a:rPr lang="en-US" smtClean="0"/>
-              <a:t>5/7/22</a:t>
+              <a:t>5/11/22</a:t>
             </a:fld>
             <a:endParaRPr lang="en-US"/>
           </a:p>
@@ -1009,7 +1009,7 @@
           <a:p>
             <a:fld id="{36D6B43A-FB72-2B4A-8DB0-B6C23179BADB}" type="datetimeFigureOut">
               <a:rPr lang="en-US" smtClean="0"/>
-              <a:t>5/7/22</a:t>
+              <a:t>5/11/22</a:t>
             </a:fld>
             <a:endParaRPr lang="en-US"/>
           </a:p>
@@ -1241,7 +1241,7 @@
           <a:p>
             <a:fld id="{36D6B43A-FB72-2B4A-8DB0-B6C23179BADB}" type="datetimeFigureOut">
               <a:rPr lang="en-US" smtClean="0"/>
-              <a:t>5/7/22</a:t>
+              <a:t>5/11/22</a:t>
             </a:fld>
             <a:endParaRPr lang="en-US"/>
           </a:p>
@@ -1608,7 +1608,7 @@
           <a:p>
             <a:fld id="{36D6B43A-FB72-2B4A-8DB0-B6C23179BADB}" type="datetimeFigureOut">
               <a:rPr lang="en-US" smtClean="0"/>
-              <a:t>5/7/22</a:t>
+              <a:t>5/11/22</a:t>
             </a:fld>
             <a:endParaRPr lang="en-US"/>
           </a:p>
@@ -1726,7 +1726,7 @@
           <a:p>
             <a:fld id="{36D6B43A-FB72-2B4A-8DB0-B6C23179BADB}" type="datetimeFigureOut">
               <a:rPr lang="en-US" smtClean="0"/>
-              <a:t>5/7/22</a:t>
+              <a:t>5/11/22</a:t>
             </a:fld>
             <a:endParaRPr lang="en-US"/>
           </a:p>
@@ -1821,7 +1821,7 @@
           <a:p>
             <a:fld id="{36D6B43A-FB72-2B4A-8DB0-B6C23179BADB}" type="datetimeFigureOut">
               <a:rPr lang="en-US" smtClean="0"/>
-              <a:t>5/7/22</a:t>
+              <a:t>5/11/22</a:t>
             </a:fld>
             <a:endParaRPr lang="en-US"/>
           </a:p>
@@ -2098,7 +2098,7 @@
           <a:p>
             <a:fld id="{36D6B43A-FB72-2B4A-8DB0-B6C23179BADB}" type="datetimeFigureOut">
               <a:rPr lang="en-US" smtClean="0"/>
-              <a:t>5/7/22</a:t>
+              <a:t>5/11/22</a:t>
             </a:fld>
             <a:endParaRPr lang="en-US"/>
           </a:p>
@@ -2355,7 +2355,7 @@
           <a:p>
             <a:fld id="{36D6B43A-FB72-2B4A-8DB0-B6C23179BADB}" type="datetimeFigureOut">
               <a:rPr lang="en-US" smtClean="0"/>
-              <a:t>5/7/22</a:t>
+              <a:t>5/11/22</a:t>
             </a:fld>
             <a:endParaRPr lang="en-US"/>
           </a:p>
@@ -2568,7 +2568,7 @@
           <a:p>
             <a:fld id="{36D6B43A-FB72-2B4A-8DB0-B6C23179BADB}" type="datetimeFigureOut">
               <a:rPr lang="en-US" smtClean="0"/>
-              <a:t>5/7/22</a:t>
+              <a:t>5/11/22</a:t>
             </a:fld>
             <a:endParaRPr lang="en-US"/>
           </a:p>
@@ -3663,8 +3663,8 @@
         </p:nvSpPr>
         <p:spPr>
           <a:xfrm>
-            <a:off x="5904454" y="7985328"/>
-            <a:ext cx="3277135" cy="646331"/>
+            <a:off x="5834372" y="7976495"/>
+            <a:ext cx="3556693" cy="646331"/>
           </a:xfrm>
           <a:prstGeom prst="rect">
             <a:avLst/>
@@ -3679,7 +3679,7 @@
           <a:p>
             <a:r>
               <a:rPr lang="en-US" dirty="0"/>
-              <a:t>4) </a:t>
+              <a:t>3b) </a:t>
             </a:r>
             <a:r>
               <a:rPr lang="en-US" b="1" dirty="0" err="1"/>
@@ -3723,7 +3723,7 @@
             <a:pPr algn="ctr"/>
             <a:r>
               <a:rPr lang="en-US" dirty="0"/>
-              <a:t>3) Choose </a:t>
+              <a:t>3a) Choose </a:t>
             </a:r>
             <a:r>
               <a:rPr lang="en-US" b="1" dirty="0"/>
@@ -3746,7 +3746,7 @@
         </p:nvSpPr>
         <p:spPr>
           <a:xfrm>
-            <a:off x="3944688" y="2314558"/>
+            <a:off x="3974668" y="1909826"/>
             <a:ext cx="610913" cy="722643"/>
           </a:xfrm>
           <a:prstGeom prst="rightArrow">
@@ -3805,14 +3805,17 @@
         </p:nvSpPr>
         <p:spPr>
           <a:xfrm rot="10800000" flipV="1">
-            <a:off x="4800474" y="5511158"/>
-            <a:ext cx="688359" cy="716625"/>
+            <a:off x="4679271" y="7917923"/>
+            <a:ext cx="958778" cy="716625"/>
           </a:xfrm>
           <a:prstGeom prst="rightArrow">
             <a:avLst/>
           </a:prstGeom>
           <a:solidFill>
-            <a:srgbClr val="92D050"/>
+            <a:schemeClr val="accent6">
+              <a:lumMod val="40000"/>
+              <a:lumOff val="60000"/>
+            </a:schemeClr>
           </a:solidFill>
           <a:ln>
             <a:solidFill>
@@ -3881,7 +3884,7 @@
             <a:pPr algn="ctr"/>
             <a:r>
               <a:rPr lang="en-US" dirty="0"/>
-              <a:t>5) Use ages of congruent nodes to </a:t>
+              <a:t>3c) Use ages of congruent nodes to </a:t>
             </a:r>
             <a:r>
               <a:rPr lang="en-US" b="1" dirty="0"/>
@@ -3904,8 +3907,8 @@
         </p:nvSpPr>
         <p:spPr>
           <a:xfrm>
-            <a:off x="10231494" y="4023148"/>
-            <a:ext cx="4902007" cy="5120851"/>
+            <a:off x="159294" y="4023148"/>
+            <a:ext cx="14974207" cy="5120851"/>
           </a:xfrm>
           <a:prstGeom prst="roundRect">
             <a:avLst/>
@@ -3949,10 +3952,10 @@
       </p:sp>
       <p:sp>
         <p:nvSpPr>
-          <p:cNvPr id="46" name="Rounded Rectangle 45">
+          <p:cNvPr id="49" name="Rounded Rectangle 48">
             <a:extLst>
               <a:ext uri="{FF2B5EF4-FFF2-40B4-BE49-F238E27FC236}">
-                <a16:creationId xmlns:a16="http://schemas.microsoft.com/office/drawing/2014/main" id="{DF4C36AE-6208-E241-994B-9CB06B47231B}"/>
+                <a16:creationId xmlns:a16="http://schemas.microsoft.com/office/drawing/2014/main" id="{56623323-5AFA-0840-A232-8400F1FBBC9D}"/>
               </a:ext>
             </a:extLst>
           </p:cNvPr>
@@ -3961,8 +3964,8 @@
         </p:nvSpPr>
         <p:spPr>
           <a:xfrm>
-            <a:off x="38630" y="4023148"/>
-            <a:ext cx="4719774" cy="5091719"/>
+            <a:off x="8761" y="-8906"/>
+            <a:ext cx="3898621" cy="3405827"/>
           </a:xfrm>
           <a:prstGeom prst="roundRect">
             <a:avLst/>
@@ -4006,119 +4009,6 @@
       </p:sp>
       <p:sp>
         <p:nvSpPr>
-          <p:cNvPr id="47" name="TextBox 46">
-            <a:extLst>
-              <a:ext uri="{FF2B5EF4-FFF2-40B4-BE49-F238E27FC236}">
-                <a16:creationId xmlns:a16="http://schemas.microsoft.com/office/drawing/2014/main" id="{975C0793-409C-F546-BDAB-F28196CE4460}"/>
-              </a:ext>
-            </a:extLst>
-          </p:cNvPr>
-          <p:cNvSpPr txBox="1"/>
-          <p:nvPr/>
-        </p:nvSpPr>
-        <p:spPr>
-          <a:xfrm>
-            <a:off x="4606129" y="2691844"/>
-            <a:ext cx="4264462" cy="646331"/>
-          </a:xfrm>
-          <a:prstGeom prst="rect">
-            <a:avLst/>
-          </a:prstGeom>
-          <a:noFill/>
-        </p:spPr>
-        <p:txBody>
-          <a:bodyPr wrap="square" rtlCol="0">
-            <a:spAutoFit/>
-          </a:bodyPr>
-          <a:lstStyle/>
-          <a:p>
-            <a:pPr algn="ctr"/>
-            <a:r>
-              <a:rPr lang="en-US" dirty="0"/>
-              <a:t>2a) Match </a:t>
-            </a:r>
-            <a:r>
-              <a:rPr lang="en-US" b="1" dirty="0"/>
-              <a:t>processed taxon names</a:t>
-            </a:r>
-            <a:r>
-              <a:rPr lang="en-US" dirty="0"/>
-              <a:t> to chronogram database and identify (</a:t>
-            </a:r>
-            <a:r>
-              <a:rPr lang="en-US" dirty="0">
-                <a:solidFill>
-                  <a:srgbClr val="FF0000"/>
-                </a:solidFill>
-              </a:rPr>
-              <a:t>*</a:t>
-            </a:r>
-            <a:r>
-              <a:rPr lang="en-US" dirty="0"/>
-              <a:t>). </a:t>
-            </a:r>
-          </a:p>
-        </p:txBody>
-      </p:sp>
-      <p:sp>
-        <p:nvSpPr>
-          <p:cNvPr id="49" name="Rounded Rectangle 48">
-            <a:extLst>
-              <a:ext uri="{FF2B5EF4-FFF2-40B4-BE49-F238E27FC236}">
-                <a16:creationId xmlns:a16="http://schemas.microsoft.com/office/drawing/2014/main" id="{56623323-5AFA-0840-A232-8400F1FBBC9D}"/>
-              </a:ext>
-            </a:extLst>
-          </p:cNvPr>
-          <p:cNvSpPr/>
-          <p:nvPr/>
-        </p:nvSpPr>
-        <p:spPr>
-          <a:xfrm>
-            <a:off x="8761" y="-8906"/>
-            <a:ext cx="3898621" cy="3405827"/>
-          </a:xfrm>
-          <a:prstGeom prst="roundRect">
-            <a:avLst/>
-          </a:prstGeom>
-          <a:noFill/>
-          <a:ln w="38100">
-            <a:solidFill>
-              <a:srgbClr val="92D050"/>
-            </a:solidFill>
-          </a:ln>
-        </p:spPr>
-        <p:style>
-          <a:lnRef idx="2">
-            <a:schemeClr val="accent1">
-              <a:shade val="50000"/>
-            </a:schemeClr>
-          </a:lnRef>
-          <a:fillRef idx="1">
-            <a:schemeClr val="accent1"/>
-          </a:fillRef>
-          <a:effectRef idx="0">
-            <a:schemeClr val="accent1"/>
-          </a:effectRef>
-          <a:fontRef idx="minor">
-            <a:schemeClr val="lt1"/>
-          </a:fontRef>
-        </p:style>
-        <p:txBody>
-          <a:bodyPr rot="0" spcFirstLastPara="0" vertOverflow="overflow" horzOverflow="overflow" vert="horz" wrap="square" lIns="91440" tIns="45720" rIns="91440" bIns="45720" numCol="1" spcCol="0" rtlCol="0" fromWordArt="0" anchor="ctr" anchorCtr="0" forceAA="0" compatLnSpc="1">
-            <a:prstTxWarp prst="textNoShape">
-              <a:avLst/>
-            </a:prstTxWarp>
-            <a:noAutofit/>
-          </a:bodyPr>
-          <a:lstStyle/>
-          <a:p>
-            <a:pPr algn="ctr"/>
-            <a:endParaRPr lang="en-US"/>
-          </a:p>
-        </p:txBody>
-      </p:sp>
-      <p:sp>
-        <p:nvSpPr>
           <p:cNvPr id="51" name="TextBox 50">
             <a:extLst>
               <a:ext uri="{FF2B5EF4-FFF2-40B4-BE49-F238E27FC236}">
@@ -4131,7 +4021,7 @@
         </p:nvSpPr>
         <p:spPr>
           <a:xfrm>
-            <a:off x="9467893" y="2467444"/>
+            <a:off x="9391065" y="2213784"/>
             <a:ext cx="2836889" cy="923330"/>
           </a:xfrm>
           <a:prstGeom prst="rect">
@@ -4158,63 +4048,6 @@
               <a:rPr lang="en-US" dirty="0"/>
               <a:t>).</a:t>
             </a:r>
-          </a:p>
-        </p:txBody>
-      </p:sp>
-      <p:sp>
-        <p:nvSpPr>
-          <p:cNvPr id="54" name="Rounded Rectangle 53">
-            <a:extLst>
-              <a:ext uri="{FF2B5EF4-FFF2-40B4-BE49-F238E27FC236}">
-                <a16:creationId xmlns:a16="http://schemas.microsoft.com/office/drawing/2014/main" id="{DC50EA97-6647-2143-B29D-D0F836D6D119}"/>
-              </a:ext>
-            </a:extLst>
-          </p:cNvPr>
-          <p:cNvSpPr/>
-          <p:nvPr/>
-        </p:nvSpPr>
-        <p:spPr>
-          <a:xfrm>
-            <a:off x="5579870" y="4025907"/>
-            <a:ext cx="3888023" cy="5091720"/>
-          </a:xfrm>
-          <a:prstGeom prst="roundRect">
-            <a:avLst/>
-          </a:prstGeom>
-          <a:noFill/>
-          <a:ln w="38100">
-            <a:solidFill>
-              <a:srgbClr val="92D050"/>
-            </a:solidFill>
-          </a:ln>
-        </p:spPr>
-        <p:style>
-          <a:lnRef idx="2">
-            <a:schemeClr val="accent1">
-              <a:shade val="50000"/>
-            </a:schemeClr>
-          </a:lnRef>
-          <a:fillRef idx="1">
-            <a:schemeClr val="accent1"/>
-          </a:fillRef>
-          <a:effectRef idx="0">
-            <a:schemeClr val="accent1"/>
-          </a:effectRef>
-          <a:fontRef idx="minor">
-            <a:schemeClr val="lt1"/>
-          </a:fontRef>
-        </p:style>
-        <p:txBody>
-          <a:bodyPr rot="0" spcFirstLastPara="0" vertOverflow="overflow" horzOverflow="overflow" vert="horz" wrap="square" lIns="91440" tIns="45720" rIns="91440" bIns="45720" numCol="1" spcCol="0" rtlCol="0" fromWordArt="0" anchor="ctr" anchorCtr="0" forceAA="0" compatLnSpc="1">
-            <a:prstTxWarp prst="textNoShape">
-              <a:avLst/>
-            </a:prstTxWarp>
-            <a:noAutofit/>
-          </a:bodyPr>
-          <a:lstStyle/>
-          <a:p>
-            <a:pPr algn="ctr"/>
-            <a:endParaRPr lang="en-US"/>
           </a:p>
         </p:txBody>
       </p:sp>
@@ -4363,14 +4196,17 @@
         </p:nvSpPr>
         <p:spPr>
           <a:xfrm rot="10800000" flipV="1">
-            <a:off x="9483368" y="7917923"/>
-            <a:ext cx="688359" cy="716625"/>
+            <a:off x="9483367" y="7917923"/>
+            <a:ext cx="1006451" cy="716625"/>
           </a:xfrm>
           <a:prstGeom prst="rightArrow">
             <a:avLst/>
           </a:prstGeom>
           <a:solidFill>
-            <a:srgbClr val="92D050"/>
+            <a:schemeClr val="accent6">
+              <a:lumMod val="40000"/>
+              <a:lumOff val="60000"/>
+            </a:schemeClr>
           </a:solidFill>
           <a:ln>
             <a:solidFill>
@@ -4422,7 +4258,7 @@
         </p:nvSpPr>
         <p:spPr>
           <a:xfrm rot="5400000" flipV="1">
-            <a:off x="11912377" y="3341237"/>
+            <a:off x="11032045" y="3341235"/>
             <a:ext cx="617547" cy="716625"/>
           </a:xfrm>
           <a:prstGeom prst="rightArrow">
@@ -4828,14 +4664,17 @@
         </p:nvSpPr>
         <p:spPr>
           <a:xfrm rot="5400000" flipV="1">
-            <a:off x="1597334" y="1253648"/>
-            <a:ext cx="443057" cy="716625"/>
+            <a:off x="1522158" y="1290511"/>
+            <a:ext cx="646331" cy="716625"/>
           </a:xfrm>
           <a:prstGeom prst="rightArrow">
             <a:avLst/>
           </a:prstGeom>
           <a:solidFill>
-            <a:srgbClr val="92D050"/>
+            <a:schemeClr val="accent6">
+              <a:lumMod val="40000"/>
+              <a:lumOff val="60000"/>
+            </a:schemeClr>
           </a:solidFill>
           <a:ln>
             <a:solidFill>
@@ -5011,7 +4850,7 @@
         </p:blipFill>
         <p:spPr>
           <a:xfrm>
-            <a:off x="4820317" y="988340"/>
+            <a:off x="4896218" y="763122"/>
             <a:ext cx="518012" cy="1154930"/>
           </a:xfrm>
           <a:prstGeom prst="rect">
@@ -5098,7 +4937,7 @@
         </p:blipFill>
         <p:spPr>
           <a:xfrm>
-            <a:off x="6930262" y="746051"/>
+            <a:off x="7005918" y="167777"/>
             <a:ext cx="606780" cy="1689675"/>
           </a:xfrm>
           <a:prstGeom prst="rect">
@@ -5127,7 +4966,7 @@
         </p:blipFill>
         <p:spPr>
           <a:xfrm>
-            <a:off x="5458090" y="2121178"/>
+            <a:off x="4754472" y="2708115"/>
             <a:ext cx="883578" cy="377873"/>
           </a:xfrm>
           <a:prstGeom prst="rect">
@@ -5185,7 +5024,7 @@
         </p:blipFill>
         <p:spPr>
           <a:xfrm>
-            <a:off x="7532851" y="109810"/>
+            <a:off x="6003656" y="2822842"/>
             <a:ext cx="729573" cy="372749"/>
           </a:xfrm>
           <a:prstGeom prst="rect">
@@ -5214,7 +5053,7 @@
         </p:blipFill>
         <p:spPr>
           <a:xfrm>
-            <a:off x="7751041" y="950150"/>
+            <a:off x="7912902" y="284441"/>
             <a:ext cx="729572" cy="1346019"/>
           </a:xfrm>
           <a:prstGeom prst="rect">
@@ -5236,14 +5075,17 @@
         </p:nvSpPr>
         <p:spPr>
           <a:xfrm>
-            <a:off x="8832374" y="2562056"/>
-            <a:ext cx="558267" cy="722643"/>
+            <a:off x="8771358" y="2160811"/>
+            <a:ext cx="903555" cy="722643"/>
           </a:xfrm>
           <a:prstGeom prst="rightArrow">
             <a:avLst/>
           </a:prstGeom>
           <a:solidFill>
-            <a:srgbClr val="92D050"/>
+            <a:schemeClr val="accent6">
+              <a:lumMod val="40000"/>
+              <a:lumOff val="60000"/>
+            </a:schemeClr>
           </a:solidFill>
           <a:ln>
             <a:solidFill>
@@ -5398,6 +5240,91 @@
           </a:p>
         </p:txBody>
       </p:sp>
+      <p:sp>
+        <p:nvSpPr>
+          <p:cNvPr id="61" name="TextBox 60">
+            <a:extLst>
+              <a:ext uri="{FF2B5EF4-FFF2-40B4-BE49-F238E27FC236}">
+                <a16:creationId xmlns:a16="http://schemas.microsoft.com/office/drawing/2014/main" id="{7CABD093-2009-19AA-1BE0-F4CD72DEE50D}"/>
+              </a:ext>
+            </a:extLst>
+          </p:cNvPr>
+          <p:cNvSpPr txBox="1"/>
+          <p:nvPr/>
+        </p:nvSpPr>
+        <p:spPr>
+          <a:xfrm>
+            <a:off x="4497949" y="2014953"/>
+            <a:ext cx="4264462" cy="646331"/>
+          </a:xfrm>
+          <a:prstGeom prst="rect">
+            <a:avLst/>
+          </a:prstGeom>
+          <a:noFill/>
+        </p:spPr>
+        <p:txBody>
+          <a:bodyPr wrap="square" rtlCol="0">
+            <a:spAutoFit/>
+          </a:bodyPr>
+          <a:lstStyle/>
+          <a:p>
+            <a:pPr algn="ctr"/>
+            <a:r>
+              <a:rPr lang="en-US" dirty="0"/>
+              <a:t>2a) Match </a:t>
+            </a:r>
+            <a:r>
+              <a:rPr lang="en-US" b="1" dirty="0"/>
+              <a:t>processed taxon names</a:t>
+            </a:r>
+            <a:r>
+              <a:rPr lang="en-US" dirty="0"/>
+              <a:t> to chronogram database and identify (</a:t>
+            </a:r>
+            <a:r>
+              <a:rPr lang="en-US" dirty="0">
+                <a:solidFill>
+                  <a:srgbClr val="FF0000"/>
+                </a:solidFill>
+              </a:rPr>
+              <a:t>*</a:t>
+            </a:r>
+            <a:r>
+              <a:rPr lang="en-US" dirty="0"/>
+              <a:t>). </a:t>
+            </a:r>
+          </a:p>
+        </p:txBody>
+      </p:sp>
+      <p:pic>
+        <p:nvPicPr>
+          <p:cNvPr id="64" name="Picture 63">
+            <a:extLst>
+              <a:ext uri="{FF2B5EF4-FFF2-40B4-BE49-F238E27FC236}">
+                <a16:creationId xmlns:a16="http://schemas.microsoft.com/office/drawing/2014/main" id="{D6BDA928-65D3-AF38-C686-638A07A37197}"/>
+              </a:ext>
+            </a:extLst>
+          </p:cNvPr>
+          <p:cNvPicPr>
+            <a:picLocks noChangeAspect="1"/>
+          </p:cNvPicPr>
+          <p:nvPr/>
+        </p:nvPicPr>
+        <p:blipFill rotWithShape="1">
+          <a:blip r:embed="rId18"/>
+          <a:srcRect l="31349" t="16187" r="45578" b="27268"/>
+          <a:stretch/>
+        </p:blipFill>
+        <p:spPr>
+          <a:xfrm rot="10800000">
+            <a:off x="7064097" y="2873418"/>
+            <a:ext cx="445514" cy="427843"/>
+          </a:xfrm>
+          <a:prstGeom prst="rect">
+            <a:avLst/>
+          </a:prstGeom>
+        </p:spPr>
+      </p:pic>
     </p:spTree>
     <p:extLst>
       <p:ext uri="{BB962C8B-B14F-4D97-AF65-F5344CB8AC3E}">

</xml_diff>

<commit_message>
updating figure 1, again
</commit_message>
<xml_diff>
--- a/figures/figure1/figure1-new.pptx
+++ b/figures/figure1/figure1-new.pptx
@@ -3157,7 +3157,7 @@
         </p:nvSpPr>
         <p:spPr>
           <a:xfrm>
-            <a:off x="5770908" y="4082020"/>
+            <a:off x="5799936" y="4009450"/>
             <a:ext cx="3096675" cy="923330"/>
           </a:xfrm>
           <a:prstGeom prst="rect">
@@ -3174,7 +3174,7 @@
             <a:pPr algn="r"/>
             <a:r>
               <a:rPr lang="en-US" dirty="0"/>
-              <a:t>3b) </a:t>
+              <a:t>C2) </a:t>
             </a:r>
             <a:r>
               <a:rPr lang="en-US" b="1" dirty="0" err="1"/>
@@ -3218,7 +3218,7 @@
             <a:pPr algn="ctr"/>
             <a:r>
               <a:rPr lang="en-US" dirty="0"/>
-              <a:t>3a) Choose a </a:t>
+              <a:t>C1) Choose a </a:t>
             </a:r>
             <a:r>
               <a:rPr lang="en-US" b="1" dirty="0"/>
@@ -3241,7 +3241,7 @@
         </p:nvSpPr>
         <p:spPr>
           <a:xfrm rot="10800000" flipV="1">
-            <a:off x="4808294" y="4336818"/>
+            <a:off x="4792750" y="4162918"/>
             <a:ext cx="958778" cy="389958"/>
           </a:xfrm>
           <a:prstGeom prst="rightArrow">
@@ -3303,7 +3303,7 @@
         </p:nvSpPr>
         <p:spPr>
           <a:xfrm>
-            <a:off x="1259478" y="4074336"/>
+            <a:off x="1259478" y="4001766"/>
             <a:ext cx="3432702" cy="646331"/>
           </a:xfrm>
           <a:prstGeom prst="rect">
@@ -3320,7 +3320,7 @@
             <a:pPr algn="r"/>
             <a:r>
               <a:rPr lang="en-US" dirty="0"/>
-              <a:t>3c) Use ages of congruent nodes to </a:t>
+              <a:t>C3) Use ages of congruent nodes to </a:t>
             </a:r>
             <a:r>
               <a:rPr lang="en-US" b="1" dirty="0"/>
@@ -3343,8 +3343,8 @@
         </p:nvSpPr>
         <p:spPr>
           <a:xfrm>
-            <a:off x="4475" y="3978179"/>
-            <a:ext cx="14629540" cy="5120851"/>
+            <a:off x="42249" y="3978179"/>
+            <a:ext cx="14551831" cy="5120851"/>
           </a:xfrm>
           <a:prstGeom prst="roundRect">
             <a:avLst/>
@@ -4000,7 +4000,7 @@
         </p:nvSpPr>
         <p:spPr>
           <a:xfrm>
-            <a:off x="10112391" y="3988626"/>
+            <a:off x="10083363" y="3974112"/>
             <a:ext cx="4481690" cy="414059"/>
           </a:xfrm>
           <a:prstGeom prst="roundRect">
@@ -4047,50 +4047,6 @@
       </p:sp>
       <p:sp>
         <p:nvSpPr>
-          <p:cNvPr id="93" name="TextBox 92">
-            <a:extLst>
-              <a:ext uri="{FF2B5EF4-FFF2-40B4-BE49-F238E27FC236}">
-                <a16:creationId xmlns:a16="http://schemas.microsoft.com/office/drawing/2014/main" id="{D019AA0B-EF8E-0DF3-3F3A-E57804BB23C9}"/>
-              </a:ext>
-            </a:extLst>
-          </p:cNvPr>
-          <p:cNvSpPr txBox="1"/>
-          <p:nvPr/>
-        </p:nvSpPr>
-        <p:spPr>
-          <a:xfrm>
-            <a:off x="10082930" y="3976490"/>
-            <a:ext cx="4433713" cy="400110"/>
-          </a:xfrm>
-          <a:prstGeom prst="rect">
-            <a:avLst/>
-          </a:prstGeom>
-          <a:noFill/>
-        </p:spPr>
-        <p:txBody>
-          <a:bodyPr wrap="none" rtlCol="0">
-            <a:spAutoFit/>
-          </a:bodyPr>
-          <a:lstStyle/>
-          <a:p>
-            <a:pPr algn="ctr"/>
-            <a:r>
-              <a:rPr lang="en-US" sz="2000" b="1" dirty="0"/>
-              <a:t>3. Summarizing </a:t>
-            </a:r>
-            <a:r>
-              <a:rPr lang="en-US" sz="2000" b="1" dirty="0" err="1"/>
-              <a:t>DateLife’s</a:t>
-            </a:r>
-            <a:r>
-              <a:rPr lang="en-US" sz="2000" b="1" dirty="0"/>
-              <a:t> search results</a:t>
-            </a:r>
-          </a:p>
-        </p:txBody>
-      </p:sp>
-      <p:sp>
-        <p:nvSpPr>
           <p:cNvPr id="119" name="TextBox 118">
             <a:extLst>
               <a:ext uri="{FF2B5EF4-FFF2-40B4-BE49-F238E27FC236}">
@@ -4164,7 +4120,7 @@
         </p:nvSpPr>
         <p:spPr>
           <a:xfrm>
-            <a:off x="181547" y="2760690"/>
+            <a:off x="239603" y="2760690"/>
             <a:ext cx="3853372" cy="646331"/>
           </a:xfrm>
           <a:prstGeom prst="rect">
@@ -4178,10 +4134,9 @@
           </a:bodyPr>
           <a:lstStyle/>
           <a:p>
-            <a:pPr algn="ctr"/>
             <a:r>
               <a:rPr lang="en-US" dirty="0"/>
-              <a:t>1b) Process taxon names with </a:t>
+              <a:t>A2) Process taxon names with </a:t>
             </a:r>
             <a:r>
               <a:rPr lang="en-US" b="1" dirty="0"/>
@@ -4192,8 +4147,8 @@
               <a:t> and </a:t>
             </a:r>
             <a:r>
-              <a:rPr lang="en-US" b="1" dirty="0" err="1"/>
-              <a:t>standardizE</a:t>
+              <a:rPr lang="en-US" b="1" dirty="0"/>
+              <a:t>standardize</a:t>
             </a:r>
             <a:r>
               <a:rPr lang="en-US" dirty="0"/>
@@ -4359,7 +4314,7 @@
         </p:nvSpPr>
         <p:spPr>
           <a:xfrm>
-            <a:off x="4475" y="619041"/>
+            <a:off x="91577" y="632937"/>
             <a:ext cx="4024328" cy="646331"/>
           </a:xfrm>
           <a:prstGeom prst="rect">
@@ -4373,10 +4328,9 @@
           </a:bodyPr>
           <a:lstStyle/>
           <a:p>
-            <a:pPr algn="ctr"/>
             <a:r>
               <a:rPr lang="en-US" dirty="0"/>
-              <a:t>1a) User provides a list of </a:t>
+              <a:t>A1) User provides a list of </a:t>
             </a:r>
             <a:r>
               <a:rPr lang="en-US" b="1" dirty="0"/>
@@ -4535,7 +4489,7 @@
           <a:p>
             <a:r>
               <a:rPr lang="en-US" dirty="0"/>
-              <a:t>2b) Prune matching chronograms and save as </a:t>
+              <a:t>B2) Prune matching chronograms and save as </a:t>
             </a:r>
             <a:r>
               <a:rPr lang="en-US" b="1" dirty="0"/>
@@ -4621,7 +4575,7 @@
         </p:nvSpPr>
         <p:spPr>
           <a:xfrm>
-            <a:off x="4888551" y="36098"/>
+            <a:off x="4845009" y="36098"/>
             <a:ext cx="9745462" cy="3399647"/>
           </a:xfrm>
           <a:prstGeom prst="roundRect">
@@ -4785,7 +4739,7 @@
           <a:p>
             <a:r>
               <a:rPr lang="en-US" dirty="0"/>
-              <a:t>2a) Match </a:t>
+              <a:t>B1) Match </a:t>
             </a:r>
             <a:r>
               <a:rPr lang="en-US" b="1" dirty="0"/>
@@ -4886,8 +4840,8 @@
         </p:nvSpPr>
         <p:spPr>
           <a:xfrm>
-            <a:off x="4888551" y="36677"/>
-            <a:ext cx="4816746" cy="533955"/>
+            <a:off x="4845009" y="36677"/>
+            <a:ext cx="4905458" cy="533955"/>
           </a:xfrm>
           <a:prstGeom prst="roundRect">
             <a:avLst/>
@@ -4945,7 +4899,7 @@
         </p:nvSpPr>
         <p:spPr>
           <a:xfrm>
-            <a:off x="4778008" y="85301"/>
+            <a:off x="4734466" y="85301"/>
             <a:ext cx="5106887" cy="400110"/>
           </a:xfrm>
           <a:prstGeom prst="rect">
@@ -4962,7 +4916,7 @@
             <a:pPr algn="ctr"/>
             <a:r>
               <a:rPr lang="en-US" sz="2000" b="1" dirty="0"/>
-              <a:t>2. Searching </a:t>
+              <a:t>B) Searching </a:t>
             </a:r>
             <a:r>
               <a:rPr lang="en-US" sz="2000" b="1" dirty="0" err="1"/>
@@ -5687,7 +5641,7 @@
             <a:pPr algn="ctr"/>
             <a:r>
               <a:rPr lang="en-US" sz="2000" b="1" dirty="0"/>
-              <a:t>1. Creating a </a:t>
+              <a:t>A) Creating a </a:t>
             </a:r>
             <a:r>
               <a:rPr lang="en-US" sz="2000" b="1" dirty="0" err="1"/>
@@ -5696,6 +5650,50 @@
             <a:r>
               <a:rPr lang="en-US" sz="2000" b="1" dirty="0"/>
               <a:t> search query</a:t>
+            </a:r>
+          </a:p>
+        </p:txBody>
+      </p:sp>
+      <p:sp>
+        <p:nvSpPr>
+          <p:cNvPr id="96" name="TextBox 95">
+            <a:extLst>
+              <a:ext uri="{FF2B5EF4-FFF2-40B4-BE49-F238E27FC236}">
+                <a16:creationId xmlns:a16="http://schemas.microsoft.com/office/drawing/2014/main" id="{01920247-C39D-D3E4-E5DE-6CD0B6A5750E}"/>
+              </a:ext>
+            </a:extLst>
+          </p:cNvPr>
+          <p:cNvSpPr txBox="1"/>
+          <p:nvPr/>
+        </p:nvSpPr>
+        <p:spPr>
+          <a:xfrm>
+            <a:off x="10088628" y="3976490"/>
+            <a:ext cx="4451347" cy="400110"/>
+          </a:xfrm>
+          <a:prstGeom prst="rect">
+            <a:avLst/>
+          </a:prstGeom>
+          <a:noFill/>
+        </p:spPr>
+        <p:txBody>
+          <a:bodyPr wrap="none" rtlCol="0">
+            <a:spAutoFit/>
+          </a:bodyPr>
+          <a:lstStyle/>
+          <a:p>
+            <a:pPr algn="ctr"/>
+            <a:r>
+              <a:rPr lang="en-US" sz="2000" b="1" dirty="0"/>
+              <a:t>C) Summarizing </a:t>
+            </a:r>
+            <a:r>
+              <a:rPr lang="en-US" sz="2000" b="1" dirty="0" err="1"/>
+              <a:t>DateLife’s</a:t>
+            </a:r>
+            <a:r>
+              <a:rPr lang="en-US" sz="2000" b="1" dirty="0"/>
+              <a:t> search results</a:t>
             </a:r>
           </a:p>
         </p:txBody>

</xml_diff>

<commit_message>
updating figure 1 some more
</commit_message>
<xml_diff>
--- a/figures/figure1/figure1-new.pptx
+++ b/figures/figure1/figure1-new.pptx
@@ -243,7 +243,7 @@
           <a:p>
             <a:fld id="{36D6B43A-FB72-2B4A-8DB0-B6C23179BADB}" type="datetimeFigureOut">
               <a:rPr lang="en-US" smtClean="0"/>
-              <a:t>5/27/22</a:t>
+              <a:t>5/30/22</a:t>
             </a:fld>
             <a:endParaRPr lang="en-US"/>
           </a:p>
@@ -413,7 +413,7 @@
           <a:p>
             <a:fld id="{36D6B43A-FB72-2B4A-8DB0-B6C23179BADB}" type="datetimeFigureOut">
               <a:rPr lang="en-US" smtClean="0"/>
-              <a:t>5/27/22</a:t>
+              <a:t>5/30/22</a:t>
             </a:fld>
             <a:endParaRPr lang="en-US"/>
           </a:p>
@@ -593,7 +593,7 @@
           <a:p>
             <a:fld id="{36D6B43A-FB72-2B4A-8DB0-B6C23179BADB}" type="datetimeFigureOut">
               <a:rPr lang="en-US" smtClean="0"/>
-              <a:t>5/27/22</a:t>
+              <a:t>5/30/22</a:t>
             </a:fld>
             <a:endParaRPr lang="en-US"/>
           </a:p>
@@ -763,7 +763,7 @@
           <a:p>
             <a:fld id="{36D6B43A-FB72-2B4A-8DB0-B6C23179BADB}" type="datetimeFigureOut">
               <a:rPr lang="en-US" smtClean="0"/>
-              <a:t>5/27/22</a:t>
+              <a:t>5/30/22</a:t>
             </a:fld>
             <a:endParaRPr lang="en-US"/>
           </a:p>
@@ -1009,7 +1009,7 @@
           <a:p>
             <a:fld id="{36D6B43A-FB72-2B4A-8DB0-B6C23179BADB}" type="datetimeFigureOut">
               <a:rPr lang="en-US" smtClean="0"/>
-              <a:t>5/27/22</a:t>
+              <a:t>5/30/22</a:t>
             </a:fld>
             <a:endParaRPr lang="en-US"/>
           </a:p>
@@ -1241,7 +1241,7 @@
           <a:p>
             <a:fld id="{36D6B43A-FB72-2B4A-8DB0-B6C23179BADB}" type="datetimeFigureOut">
               <a:rPr lang="en-US" smtClean="0"/>
-              <a:t>5/27/22</a:t>
+              <a:t>5/30/22</a:t>
             </a:fld>
             <a:endParaRPr lang="en-US"/>
           </a:p>
@@ -1608,7 +1608,7 @@
           <a:p>
             <a:fld id="{36D6B43A-FB72-2B4A-8DB0-B6C23179BADB}" type="datetimeFigureOut">
               <a:rPr lang="en-US" smtClean="0"/>
-              <a:t>5/27/22</a:t>
+              <a:t>5/30/22</a:t>
             </a:fld>
             <a:endParaRPr lang="en-US"/>
           </a:p>
@@ -1726,7 +1726,7 @@
           <a:p>
             <a:fld id="{36D6B43A-FB72-2B4A-8DB0-B6C23179BADB}" type="datetimeFigureOut">
               <a:rPr lang="en-US" smtClean="0"/>
-              <a:t>5/27/22</a:t>
+              <a:t>5/30/22</a:t>
             </a:fld>
             <a:endParaRPr lang="en-US"/>
           </a:p>
@@ -1821,7 +1821,7 @@
           <a:p>
             <a:fld id="{36D6B43A-FB72-2B4A-8DB0-B6C23179BADB}" type="datetimeFigureOut">
               <a:rPr lang="en-US" smtClean="0"/>
-              <a:t>5/27/22</a:t>
+              <a:t>5/30/22</a:t>
             </a:fld>
             <a:endParaRPr lang="en-US"/>
           </a:p>
@@ -2098,7 +2098,7 @@
           <a:p>
             <a:fld id="{36D6B43A-FB72-2B4A-8DB0-B6C23179BADB}" type="datetimeFigureOut">
               <a:rPr lang="en-US" smtClean="0"/>
-              <a:t>5/27/22</a:t>
+              <a:t>5/30/22</a:t>
             </a:fld>
             <a:endParaRPr lang="en-US"/>
           </a:p>
@@ -2355,7 +2355,7 @@
           <a:p>
             <a:fld id="{36D6B43A-FB72-2B4A-8DB0-B6C23179BADB}" type="datetimeFigureOut">
               <a:rPr lang="en-US" smtClean="0"/>
-              <a:t>5/27/22</a:t>
+              <a:t>5/30/22</a:t>
             </a:fld>
             <a:endParaRPr lang="en-US"/>
           </a:p>
@@ -2568,7 +2568,7 @@
           <a:p>
             <a:fld id="{36D6B43A-FB72-2B4A-8DB0-B6C23179BADB}" type="datetimeFigureOut">
               <a:rPr lang="en-US" smtClean="0"/>
-              <a:t>5/27/22</a:t>
+              <a:t>5/30/22</a:t>
             </a:fld>
             <a:endParaRPr lang="en-US"/>
           </a:p>
@@ -4000,7 +4000,7 @@
         </p:nvSpPr>
         <p:spPr>
           <a:xfrm>
-            <a:off x="10083363" y="3974112"/>
+            <a:off x="9386680" y="3974112"/>
             <a:ext cx="4481690" cy="414059"/>
           </a:xfrm>
           <a:prstGeom prst="roundRect">
@@ -4701,7 +4701,7 @@
         </p:blipFill>
         <p:spPr>
           <a:xfrm>
-            <a:off x="8902371" y="1432208"/>
+            <a:off x="5579064" y="2056133"/>
             <a:ext cx="883578" cy="377873"/>
           </a:xfrm>
           <a:prstGeom prst="rect">
@@ -4739,7 +4739,7 @@
           <a:p>
             <a:r>
               <a:rPr lang="en-US" dirty="0"/>
-              <a:t>B1) Match </a:t>
+              <a:t>B1) Search </a:t>
             </a:r>
             <a:r>
               <a:rPr lang="en-US" b="1" dirty="0"/>
@@ -4747,7 +4747,7 @@
             </a:r>
             <a:r>
               <a:rPr lang="en-US" dirty="0"/>
-              <a:t> to chronogram database and identify (</a:t>
+              <a:t> in chronogram database and identify (</a:t>
             </a:r>
             <a:r>
               <a:rPr lang="en-US" dirty="0">
@@ -4950,7 +4950,7 @@
         </p:blipFill>
         <p:spPr>
           <a:xfrm>
-            <a:off x="5277318" y="2081398"/>
+            <a:off x="5030139" y="2096349"/>
             <a:ext cx="518012" cy="1154930"/>
           </a:xfrm>
           <a:prstGeom prst="rect">
@@ -4979,7 +4979,7 @@
         </p:blipFill>
         <p:spPr>
           <a:xfrm>
-            <a:off x="5629023" y="1197252"/>
+            <a:off x="5237693" y="1215057"/>
             <a:ext cx="606779" cy="1369173"/>
           </a:xfrm>
           <a:prstGeom prst="rect">
@@ -5008,7 +5008,7 @@
         </p:blipFill>
         <p:spPr>
           <a:xfrm>
-            <a:off x="6575662" y="1344649"/>
+            <a:off x="6459256" y="1898882"/>
             <a:ext cx="511153" cy="1423388"/>
           </a:xfrm>
           <a:prstGeom prst="rect">
@@ -5037,7 +5037,7 @@
         </p:blipFill>
         <p:spPr>
           <a:xfrm>
-            <a:off x="7415529" y="1411486"/>
+            <a:off x="7067586" y="1250995"/>
             <a:ext cx="606780" cy="1689675"/>
           </a:xfrm>
           <a:prstGeom prst="rect">
@@ -5066,7 +5066,7 @@
         </p:blipFill>
         <p:spPr>
           <a:xfrm>
-            <a:off x="5135572" y="1747181"/>
+            <a:off x="4932372" y="1747181"/>
             <a:ext cx="445514" cy="427843"/>
           </a:xfrm>
           <a:prstGeom prst="rect">
@@ -5095,7 +5095,7 @@
         </p:blipFill>
         <p:spPr>
           <a:xfrm>
-            <a:off x="9105024" y="2130641"/>
+            <a:off x="7962756" y="2839008"/>
             <a:ext cx="729573" cy="372749"/>
           </a:xfrm>
           <a:prstGeom prst="rect">
@@ -5124,7 +5124,7 @@
         </p:blipFill>
         <p:spPr>
           <a:xfrm>
-            <a:off x="8100022" y="1194872"/>
+            <a:off x="7693378" y="1282704"/>
             <a:ext cx="729572" cy="1346019"/>
           </a:xfrm>
           <a:prstGeom prst="rect">
@@ -5146,7 +5146,7 @@
         </p:nvSpPr>
         <p:spPr>
           <a:xfrm>
-            <a:off x="7011280" y="1675674"/>
+            <a:off x="6456110" y="2340300"/>
             <a:ext cx="300082" cy="369332"/>
           </a:xfrm>
           <a:prstGeom prst="rect">
@@ -5185,7 +5185,7 @@
         </p:nvSpPr>
         <p:spPr>
           <a:xfrm>
-            <a:off x="5323018" y="1548511"/>
+            <a:off x="5119818" y="1548511"/>
             <a:ext cx="300082" cy="369332"/>
           </a:xfrm>
           <a:prstGeom prst="rect">
@@ -5224,7 +5224,7 @@
         </p:nvSpPr>
         <p:spPr>
           <a:xfrm>
-            <a:off x="8984480" y="2810460"/>
+            <a:off x="7186020" y="2971931"/>
             <a:ext cx="300082" cy="369332"/>
           </a:xfrm>
           <a:prstGeom prst="rect">
@@ -5270,7 +5270,7 @@
         </p:blipFill>
         <p:spPr>
           <a:xfrm rot="10800000">
-            <a:off x="9187917" y="2798863"/>
+            <a:off x="7389457" y="2960334"/>
             <a:ext cx="445514" cy="427843"/>
           </a:xfrm>
           <a:prstGeom prst="rect">
@@ -5299,7 +5299,7 @@
         </p:blipFill>
         <p:spPr>
           <a:xfrm>
-            <a:off x="8112438" y="2949521"/>
+            <a:off x="6020853" y="1396743"/>
             <a:ext cx="729573" cy="372749"/>
           </a:xfrm>
           <a:prstGeom prst="rect">
@@ -5329,7 +5329,7 @@
         </p:blipFill>
         <p:spPr>
           <a:xfrm flipH="1">
-            <a:off x="5895943" y="2573618"/>
+            <a:off x="5662526" y="2599080"/>
             <a:ext cx="896729" cy="768625"/>
           </a:xfrm>
           <a:prstGeom prst="rect">
@@ -5351,7 +5351,7 @@
         </p:nvGrpSpPr>
         <p:grpSpPr>
           <a:xfrm>
-            <a:off x="12346963" y="1687674"/>
+            <a:off x="12244091" y="1644476"/>
             <a:ext cx="2128684" cy="1689674"/>
             <a:chOff x="349831" y="5774256"/>
             <a:chExt cx="2128684" cy="1689674"/>
@@ -5458,7 +5458,7 @@
         </p:nvGrpSpPr>
         <p:grpSpPr>
           <a:xfrm>
-            <a:off x="12316913" y="122079"/>
+            <a:off x="12234429" y="119938"/>
             <a:ext cx="2128684" cy="1442486"/>
             <a:chOff x="3095159" y="6869139"/>
             <a:chExt cx="2128684" cy="1442486"/>
@@ -5668,7 +5668,7 @@
         </p:nvSpPr>
         <p:spPr>
           <a:xfrm>
-            <a:off x="10088628" y="3976490"/>
+            <a:off x="9391945" y="3976490"/>
             <a:ext cx="4451347" cy="400110"/>
           </a:xfrm>
           <a:prstGeom prst="rect">

</xml_diff>